<commit_message>
2DGP project 1st pp
2D게임플레이 프로젝트 기획 및 발표 영상 업로드
</commit_message>
<xml_diff>
--- a/Project 1st ppt/2DGP 게임기획서.pptx
+++ b/Project 1st ppt/2DGP 게임기획서.pptx
@@ -574,7 +574,7 @@
           <a:p>
             <a:fld id="{F6E0E8E6-B6EB-498A-BC29-48D81AAAA5B6}" type="datetimeFigureOut">
               <a:rPr lang="en-US" dirty="0"/>
-              <a:t>9/26/2018</a:t>
+              <a:t>11/4/2018</a:t>
             </a:fld>
             <a:endParaRPr lang="en-US" dirty="0"/>
           </a:p>
@@ -902,7 +902,7 @@
           <a:p>
             <a:fld id="{4F4A8B59-FD8C-464E-A2E0-D2DB42977C43}" type="datetimeFigureOut">
               <a:rPr lang="en-US" dirty="0"/>
-              <a:t>9/26/2018</a:t>
+              <a:t>11/4/2018</a:t>
             </a:fld>
             <a:endParaRPr lang="en-US" dirty="0"/>
           </a:p>
@@ -1093,7 +1093,7 @@
           <a:p>
             <a:fld id="{312D0685-9E9F-46AF-8733-3458A4A5B67E}" type="datetimeFigureOut">
               <a:rPr lang="en-US" dirty="0"/>
-              <a:t>9/26/2018</a:t>
+              <a:t>11/4/2018</a:t>
             </a:fld>
             <a:endParaRPr lang="en-US" dirty="0"/>
           </a:p>
@@ -1358,7 +1358,7 @@
           <a:p>
             <a:fld id="{919578A0-4252-4A4F-8A4C-4F80F1AD91FF}" type="datetimeFigureOut">
               <a:rPr lang="en-US" dirty="0"/>
-              <a:t>9/26/2018</a:t>
+              <a:t>11/4/2018</a:t>
             </a:fld>
             <a:endParaRPr lang="en-US" dirty="0"/>
           </a:p>
@@ -1781,7 +1781,7 @@
           <a:p>
             <a:fld id="{9DCDF071-3364-4AF2-8784-696D9E530376}" type="datetimeFigureOut">
               <a:rPr lang="en-US" dirty="0"/>
-              <a:t>9/26/2018</a:t>
+              <a:t>11/4/2018</a:t>
             </a:fld>
             <a:endParaRPr lang="en-US" dirty="0"/>
           </a:p>
@@ -2326,7 +2326,7 @@
           <a:p>
             <a:fld id="{12E0C83B-2A0D-4895-8D19-F0DA28872F64}" type="datetimeFigureOut">
               <a:rPr lang="en-US" dirty="0"/>
-              <a:t>9/26/2018</a:t>
+              <a:t>11/4/2018</a:t>
             </a:fld>
             <a:endParaRPr lang="en-US" dirty="0"/>
           </a:p>
@@ -3111,7 +3111,7 @@
           <a:p>
             <a:fld id="{5E32ACF0-C7E7-4CC8-840E-A2809FB4BDF6}" type="datetimeFigureOut">
               <a:rPr lang="en-US" dirty="0"/>
-              <a:t>9/26/2018</a:t>
+              <a:t>11/4/2018</a:t>
             </a:fld>
             <a:endParaRPr lang="en-US" dirty="0"/>
           </a:p>
@@ -3285,7 +3285,7 @@
           <a:p>
             <a:fld id="{DB1B64FF-53E9-4519-AFEB-B5EAE0A6C098}" type="datetimeFigureOut">
               <a:rPr lang="en-US" dirty="0"/>
-              <a:t>9/26/2018</a:t>
+              <a:t>11/4/2018</a:t>
             </a:fld>
             <a:endParaRPr lang="en-US" dirty="0"/>
           </a:p>
@@ -3464,7 +3464,7 @@
           <a:p>
             <a:fld id="{03D0605F-0999-49B8-97E8-A9F5FE66FD89}" type="datetimeFigureOut">
               <a:rPr lang="en-US" dirty="0"/>
-              <a:t>9/26/2018</a:t>
+              <a:t>11/4/2018</a:t>
             </a:fld>
             <a:endParaRPr lang="en-US" dirty="0"/>
           </a:p>
@@ -3634,7 +3634,7 @@
           <a:p>
             <a:fld id="{BD041493-8214-4CD3-9E66-4A7CE0239274}" type="datetimeFigureOut">
               <a:rPr lang="en-US" dirty="0"/>
-              <a:t>9/26/2018</a:t>
+              <a:t>11/4/2018</a:t>
             </a:fld>
             <a:endParaRPr lang="en-US" dirty="0"/>
           </a:p>
@@ -3879,7 +3879,7 @@
           <a:p>
             <a:fld id="{CD45397E-FD2D-4D0A-B33C-2E5AEFAED143}" type="datetimeFigureOut">
               <a:rPr lang="en-US" dirty="0"/>
-              <a:t>9/26/2018</a:t>
+              <a:t>11/4/2018</a:t>
             </a:fld>
             <a:endParaRPr lang="en-US" dirty="0"/>
           </a:p>
@@ -4111,7 +4111,7 @@
           <a:p>
             <a:fld id="{0E15092E-80DC-4992-A0D4-E74F7FC3042B}" type="datetimeFigureOut">
               <a:rPr lang="en-US" dirty="0"/>
-              <a:t>9/26/2018</a:t>
+              <a:t>11/4/2018</a:t>
             </a:fld>
             <a:endParaRPr lang="en-US" dirty="0"/>
           </a:p>
@@ -4491,7 +4491,7 @@
           <a:p>
             <a:fld id="{9569A4C6-EA06-4AF0-A839-1839C57399A0}" type="datetimeFigureOut">
               <a:rPr lang="en-US" dirty="0"/>
-              <a:t>9/26/2018</a:t>
+              <a:t>11/4/2018</a:t>
             </a:fld>
             <a:endParaRPr lang="en-US" dirty="0"/>
           </a:p>
@@ -4604,7 +4604,7 @@
           <a:p>
             <a:fld id="{6BF0C016-2580-485A-AC4B-4452BC379743}" type="datetimeFigureOut">
               <a:rPr lang="en-US" dirty="0"/>
-              <a:t>9/26/2018</a:t>
+              <a:t>11/4/2018</a:t>
             </a:fld>
             <a:endParaRPr lang="en-US" dirty="0"/>
           </a:p>
@@ -4694,7 +4694,7 @@
           <a:p>
             <a:fld id="{6FF0C8E6-7044-439E-9AE7-82A0C81AB0F0}" type="datetimeFigureOut">
               <a:rPr lang="en-US" dirty="0"/>
-              <a:t>9/26/2018</a:t>
+              <a:t>11/4/2018</a:t>
             </a:fld>
             <a:endParaRPr lang="en-US" dirty="0"/>
           </a:p>
@@ -4942,7 +4942,7 @@
           <a:p>
             <a:fld id="{2E95F70E-5DFF-42EC-93B3-07D70D7ED1BD}" type="datetimeFigureOut">
               <a:rPr lang="en-US" dirty="0"/>
-              <a:t>9/26/2018</a:t>
+              <a:t>11/4/2018</a:t>
             </a:fld>
             <a:endParaRPr lang="en-US" dirty="0"/>
           </a:p>
@@ -5206,7 +5206,7 @@
           <a:p>
             <a:fld id="{064520B5-A0C9-4D15-A71B-70A075D52D64}" type="datetimeFigureOut">
               <a:rPr lang="en-US" dirty="0"/>
-              <a:t>9/26/2018</a:t>
+              <a:t>11/4/2018</a:t>
             </a:fld>
             <a:endParaRPr lang="en-US" dirty="0"/>
           </a:p>
@@ -5604,7 +5604,7 @@
           <a:p>
             <a:fld id="{61EAF71F-1A43-41B7-B605-0710A83174B7}" type="datetimeFigureOut">
               <a:rPr lang="en-US" dirty="0"/>
-              <a:t>9/26/2018</a:t>
+              <a:t>11/4/2018</a:t>
             </a:fld>
             <a:endParaRPr lang="en-US" dirty="0"/>
           </a:p>
@@ -6063,7 +6063,7 @@
           <p:cNvPr id="2" name="제목 1">
             <a:extLst>
               <a:ext uri="{FF2B5EF4-FFF2-40B4-BE49-F238E27FC236}">
-                <a16:creationId xmlns="" xmlns:a16="http://schemas.microsoft.com/office/drawing/2014/main" id="{244A0563-2B1C-4000-B7BD-1DB5D75DC95F}"/>
+                <a16:creationId xmlns:a16="http://schemas.microsoft.com/office/drawing/2014/main" id="{244A0563-2B1C-4000-B7BD-1DB5D75DC95F}"/>
               </a:ext>
             </a:extLst>
           </p:cNvPr>
@@ -6090,10 +6090,6 @@
             <a:r>
               <a:rPr lang="en-US" altLang="ko-KR" dirty="0"/>
               <a:t>Shooter!!</a:t>
-            </a:r>
-            <a:r>
-              <a:rPr lang="en-US" altLang="ko-KR"/>
-              <a:t/>
             </a:r>
             <a:br>
               <a:rPr lang="en-US" altLang="ko-KR"/>
@@ -6107,7 +6103,7 @@
           <p:cNvPr id="3" name="부제목 2">
             <a:extLst>
               <a:ext uri="{FF2B5EF4-FFF2-40B4-BE49-F238E27FC236}">
-                <a16:creationId xmlns="" xmlns:a16="http://schemas.microsoft.com/office/drawing/2014/main" id="{286360F2-9518-49BA-9BBE-1615D1AF1A93}"/>
+                <a16:creationId xmlns:a16="http://schemas.microsoft.com/office/drawing/2014/main" id="{286360F2-9518-49BA-9BBE-1615D1AF1A93}"/>
               </a:ext>
             </a:extLst>
           </p:cNvPr>
@@ -6152,13 +6148,6 @@
   <p:clrMapOvr>
     <a:masterClrMapping/>
   </p:clrMapOvr>
-  <p:timing>
-    <p:tnLst>
-      <p:par>
-        <p:cTn id="1" dur="indefinite" restart="never" nodeType="tmRoot"/>
-      </p:par>
-    </p:tnLst>
-  </p:timing>
 </p:sld>
 </file>
 
@@ -6184,7 +6173,7 @@
           <p:cNvPr id="2" name="제목 1">
             <a:extLst>
               <a:ext uri="{FF2B5EF4-FFF2-40B4-BE49-F238E27FC236}">
-                <a16:creationId xmlns="" xmlns:a16="http://schemas.microsoft.com/office/drawing/2014/main" id="{D4C84356-D479-4334-9194-8528CD86A250}"/>
+                <a16:creationId xmlns:a16="http://schemas.microsoft.com/office/drawing/2014/main" id="{D4C84356-D479-4334-9194-8528CD86A250}"/>
               </a:ext>
             </a:extLst>
           </p:cNvPr>
@@ -6218,7 +6207,7 @@
           <p:cNvPr id="5" name="내용 개체 틀 4">
             <a:extLst>
               <a:ext uri="{FF2B5EF4-FFF2-40B4-BE49-F238E27FC236}">
-                <a16:creationId xmlns="" xmlns:a16="http://schemas.microsoft.com/office/drawing/2014/main" id="{388A88A2-0AE2-4C0D-8E41-771A6772CDB6}"/>
+                <a16:creationId xmlns:a16="http://schemas.microsoft.com/office/drawing/2014/main" id="{388A88A2-0AE2-4C0D-8E41-771A6772CDB6}"/>
               </a:ext>
             </a:extLst>
           </p:cNvPr>
@@ -6248,21 +6237,21 @@
                 <a:gridCol w="745438">
                   <a:extLst>
                     <a:ext uri="{9D8B030D-6E8A-4147-A177-3AD203B41FA5}">
-                      <a16:colId xmlns="" xmlns:a16="http://schemas.microsoft.com/office/drawing/2014/main" val="817937355"/>
+                      <a16:colId xmlns:a16="http://schemas.microsoft.com/office/drawing/2014/main" val="817937355"/>
                     </a:ext>
                   </a:extLst>
                 </a:gridCol>
                 <a:gridCol w="2210540">
                   <a:extLst>
                     <a:ext uri="{9D8B030D-6E8A-4147-A177-3AD203B41FA5}">
-                      <a16:colId xmlns="" xmlns:a16="http://schemas.microsoft.com/office/drawing/2014/main" val="3024832388"/>
+                      <a16:colId xmlns:a16="http://schemas.microsoft.com/office/drawing/2014/main" val="3024832388"/>
                     </a:ext>
                   </a:extLst>
                 </a:gridCol>
                 <a:gridCol w="7438971">
                   <a:extLst>
                     <a:ext uri="{9D8B030D-6E8A-4147-A177-3AD203B41FA5}">
-                      <a16:colId xmlns="" xmlns:a16="http://schemas.microsoft.com/office/drawing/2014/main" val="340120907"/>
+                      <a16:colId xmlns:a16="http://schemas.microsoft.com/office/drawing/2014/main" val="340120907"/>
                     </a:ext>
                   </a:extLst>
                 </a:gridCol>
@@ -6312,7 +6301,7 @@
                 </a:tc>
                 <a:extLst>
                   <a:ext uri="{0D108BD9-81ED-4DB2-BD59-A6C34878D82A}">
-                    <a16:rowId xmlns="" xmlns:a16="http://schemas.microsoft.com/office/drawing/2014/main" val="423171857"/>
+                    <a16:rowId xmlns:a16="http://schemas.microsoft.com/office/drawing/2014/main" val="423171857"/>
                   </a:ext>
                 </a:extLst>
               </a:tr>
@@ -6381,7 +6370,7 @@
                 </a:tc>
                 <a:extLst>
                   <a:ext uri="{0D108BD9-81ED-4DB2-BD59-A6C34878D82A}">
-                    <a16:rowId xmlns="" xmlns:a16="http://schemas.microsoft.com/office/drawing/2014/main" val="4159277651"/>
+                    <a16:rowId xmlns:a16="http://schemas.microsoft.com/office/drawing/2014/main" val="4159277651"/>
                   </a:ext>
                 </a:extLst>
               </a:tr>
@@ -6468,7 +6457,7 @@
                 </a:tc>
                 <a:extLst>
                   <a:ext uri="{0D108BD9-81ED-4DB2-BD59-A6C34878D82A}">
-                    <a16:rowId xmlns="" xmlns:a16="http://schemas.microsoft.com/office/drawing/2014/main" val="4294934032"/>
+                    <a16:rowId xmlns:a16="http://schemas.microsoft.com/office/drawing/2014/main" val="4294934032"/>
                   </a:ext>
                 </a:extLst>
               </a:tr>
@@ -6523,7 +6512,7 @@
                 </a:tc>
                 <a:extLst>
                   <a:ext uri="{0D108BD9-81ED-4DB2-BD59-A6C34878D82A}">
-                    <a16:rowId xmlns="" xmlns:a16="http://schemas.microsoft.com/office/drawing/2014/main" val="3525428259"/>
+                    <a16:rowId xmlns:a16="http://schemas.microsoft.com/office/drawing/2014/main" val="3525428259"/>
                   </a:ext>
                 </a:extLst>
               </a:tr>
@@ -6578,7 +6567,7 @@
                 </a:tc>
                 <a:extLst>
                   <a:ext uri="{0D108BD9-81ED-4DB2-BD59-A6C34878D82A}">
-                    <a16:rowId xmlns="" xmlns:a16="http://schemas.microsoft.com/office/drawing/2014/main" val="2725451361"/>
+                    <a16:rowId xmlns:a16="http://schemas.microsoft.com/office/drawing/2014/main" val="2725451361"/>
                   </a:ext>
                 </a:extLst>
               </a:tr>
@@ -6618,7 +6607,7 @@
                 </a:tc>
                 <a:extLst>
                   <a:ext uri="{0D108BD9-81ED-4DB2-BD59-A6C34878D82A}">
-                    <a16:rowId xmlns="" xmlns:a16="http://schemas.microsoft.com/office/drawing/2014/main" val="298300551"/>
+                    <a16:rowId xmlns:a16="http://schemas.microsoft.com/office/drawing/2014/main" val="298300551"/>
                   </a:ext>
                 </a:extLst>
               </a:tr>
@@ -6636,13 +6625,6 @@
   <p:clrMapOvr>
     <a:masterClrMapping/>
   </p:clrMapOvr>
-  <p:timing>
-    <p:tnLst>
-      <p:par>
-        <p:cTn id="1" dur="indefinite" restart="never" nodeType="tmRoot"/>
-      </p:par>
-    </p:tnLst>
-  </p:timing>
 </p:sld>
 </file>
 
@@ -6668,7 +6650,7 @@
           <p:cNvPr id="2" name="제목 1">
             <a:extLst>
               <a:ext uri="{FF2B5EF4-FFF2-40B4-BE49-F238E27FC236}">
-                <a16:creationId xmlns="" xmlns:a16="http://schemas.microsoft.com/office/drawing/2014/main" id="{7D9F3DE0-168E-4D23-B5BF-51F4C5A3010C}"/>
+                <a16:creationId xmlns:a16="http://schemas.microsoft.com/office/drawing/2014/main" id="{7D9F3DE0-168E-4D23-B5BF-51F4C5A3010C}"/>
               </a:ext>
             </a:extLst>
           </p:cNvPr>
@@ -6697,7 +6679,7 @@
           <p:cNvPr id="3" name="내용 개체 틀 2">
             <a:extLst>
               <a:ext uri="{FF2B5EF4-FFF2-40B4-BE49-F238E27FC236}">
-                <a16:creationId xmlns="" xmlns:a16="http://schemas.microsoft.com/office/drawing/2014/main" id="{2062A160-265B-4704-98D0-B4C763A633BA}"/>
+                <a16:creationId xmlns:a16="http://schemas.microsoft.com/office/drawing/2014/main" id="{2062A160-265B-4704-98D0-B4C763A633BA}"/>
               </a:ext>
             </a:extLst>
           </p:cNvPr>
@@ -6725,7 +6707,7 @@
           <p:cNvPr id="4" name="화살표: 오른쪽 3">
             <a:extLst>
               <a:ext uri="{FF2B5EF4-FFF2-40B4-BE49-F238E27FC236}">
-                <a16:creationId xmlns="" xmlns:a16="http://schemas.microsoft.com/office/drawing/2014/main" id="{052B0A42-4F42-47D3-B7FA-FE7216774B6B}"/>
+                <a16:creationId xmlns:a16="http://schemas.microsoft.com/office/drawing/2014/main" id="{052B0A42-4F42-47D3-B7FA-FE7216774B6B}"/>
               </a:ext>
             </a:extLst>
           </p:cNvPr>
@@ -6775,7 +6757,7 @@
           <p:cNvPr id="9" name="화살표: 오른쪽 8">
             <a:extLst>
               <a:ext uri="{FF2B5EF4-FFF2-40B4-BE49-F238E27FC236}">
-                <a16:creationId xmlns="" xmlns:a16="http://schemas.microsoft.com/office/drawing/2014/main" id="{1A52ED7A-9D74-41DD-B4CE-F367379EF4BA}"/>
+                <a16:creationId xmlns:a16="http://schemas.microsoft.com/office/drawing/2014/main" id="{1A52ED7A-9D74-41DD-B4CE-F367379EF4BA}"/>
               </a:ext>
             </a:extLst>
           </p:cNvPr>
@@ -6825,7 +6807,7 @@
           <p:cNvPr id="10" name="화살표: 오른쪽 9">
             <a:extLst>
               <a:ext uri="{FF2B5EF4-FFF2-40B4-BE49-F238E27FC236}">
-                <a16:creationId xmlns="" xmlns:a16="http://schemas.microsoft.com/office/drawing/2014/main" id="{FB87EBF1-013F-4E49-A608-21C7B9806015}"/>
+                <a16:creationId xmlns:a16="http://schemas.microsoft.com/office/drawing/2014/main" id="{FB87EBF1-013F-4E49-A608-21C7B9806015}"/>
               </a:ext>
             </a:extLst>
           </p:cNvPr>
@@ -6875,7 +6857,7 @@
           <p:cNvPr id="11" name="화살표: 오른쪽 10">
             <a:extLst>
               <a:ext uri="{FF2B5EF4-FFF2-40B4-BE49-F238E27FC236}">
-                <a16:creationId xmlns="" xmlns:a16="http://schemas.microsoft.com/office/drawing/2014/main" id="{8C8FBFD8-9BC2-49AA-A85C-AE3551542D93}"/>
+                <a16:creationId xmlns:a16="http://schemas.microsoft.com/office/drawing/2014/main" id="{8C8FBFD8-9BC2-49AA-A85C-AE3551542D93}"/>
               </a:ext>
             </a:extLst>
           </p:cNvPr>
@@ -6930,13 +6912,6 @@
   <p:clrMapOvr>
     <a:masterClrMapping/>
   </p:clrMapOvr>
-  <p:timing>
-    <p:tnLst>
-      <p:par>
-        <p:cTn id="1" dur="indefinite" restart="never" nodeType="tmRoot"/>
-      </p:par>
-    </p:tnLst>
-  </p:timing>
 </p:sld>
 </file>
 
@@ -6962,7 +6937,7 @@
           <p:cNvPr id="2" name="제목 1">
             <a:extLst>
               <a:ext uri="{FF2B5EF4-FFF2-40B4-BE49-F238E27FC236}">
-                <a16:creationId xmlns="" xmlns:a16="http://schemas.microsoft.com/office/drawing/2014/main" id="{8AB96F0D-2534-4A94-AA5F-A80CED46040D}"/>
+                <a16:creationId xmlns:a16="http://schemas.microsoft.com/office/drawing/2014/main" id="{8AB96F0D-2534-4A94-AA5F-A80CED46040D}"/>
               </a:ext>
             </a:extLst>
           </p:cNvPr>
@@ -6998,7 +6973,7 @@
           <p:cNvPr id="4" name="텍스트 개체 틀 3">
             <a:extLst>
               <a:ext uri="{FF2B5EF4-FFF2-40B4-BE49-F238E27FC236}">
-                <a16:creationId xmlns="" xmlns:a16="http://schemas.microsoft.com/office/drawing/2014/main" id="{48F03D8C-6E8A-4E79-AAAE-DEF8F617C150}"/>
+                <a16:creationId xmlns:a16="http://schemas.microsoft.com/office/drawing/2014/main" id="{48F03D8C-6E8A-4E79-AAAE-DEF8F617C150}"/>
               </a:ext>
             </a:extLst>
           </p:cNvPr>
@@ -7020,25 +6995,25 @@
           <a:lstStyle/>
           <a:p>
             <a:r>
-              <a:rPr lang="ko-KR" altLang="en-US" dirty="0" smtClean="0"/>
+              <a:rPr lang="ko-KR" altLang="en-US" dirty="0"/>
               <a:t>기존의 </a:t>
             </a:r>
             <a:r>
-              <a:rPr lang="ko-KR" altLang="en-US" dirty="0" err="1" smtClean="0"/>
+              <a:rPr lang="ko-KR" altLang="en-US" dirty="0" err="1"/>
               <a:t>포켓몬스터</a:t>
             </a:r>
             <a:r>
-              <a:rPr lang="en-US" altLang="ko-KR" dirty="0" smtClean="0"/>
+              <a:rPr lang="en-US" altLang="ko-KR" dirty="0"/>
               <a:t>…?</a:t>
             </a:r>
           </a:p>
           <a:p>
             <a:r>
-              <a:rPr lang="ko-KR" altLang="en-US" dirty="0" smtClean="0"/>
+              <a:rPr lang="ko-KR" altLang="en-US" dirty="0"/>
               <a:t>풀숲을 돌아다닌다 → </a:t>
             </a:r>
             <a:r>
-              <a:rPr lang="ko-KR" altLang="en-US" b="1" u="sng" dirty="0" err="1" smtClean="0">
+              <a:rPr lang="ko-KR" altLang="en-US" b="1" u="sng" dirty="0" err="1">
                 <a:solidFill>
                   <a:srgbClr val="FF0000"/>
                 </a:solidFill>
@@ -7046,7 +7021,7 @@
               <a:t>몬스터를</a:t>
             </a:r>
             <a:r>
-              <a:rPr lang="ko-KR" altLang="en-US" b="1" u="sng" dirty="0" smtClean="0">
+              <a:rPr lang="ko-KR" altLang="en-US" b="1" u="sng" dirty="0">
                 <a:solidFill>
                   <a:srgbClr val="FF0000"/>
                 </a:solidFill>
@@ -7054,7 +7029,7 @@
               <a:t> 발견한다</a:t>
             </a:r>
             <a:r>
-              <a:rPr lang="en-US" altLang="ko-KR" b="1" u="sng" dirty="0" smtClean="0">
+              <a:rPr lang="en-US" altLang="ko-KR" b="1" u="sng" dirty="0">
                 <a:solidFill>
                   <a:srgbClr val="FF0000"/>
                 </a:solidFill>
@@ -7062,11 +7037,11 @@
               <a:t>! </a:t>
             </a:r>
             <a:r>
-              <a:rPr lang="ko-KR" altLang="en-US" b="1" u="sng" dirty="0" smtClean="0"/>
+              <a:rPr lang="ko-KR" altLang="en-US" b="1" u="sng" dirty="0"/>
               <a:t>→ </a:t>
             </a:r>
             <a:r>
-              <a:rPr lang="ko-KR" altLang="en-US" b="1" u="sng" dirty="0" smtClean="0">
+              <a:rPr lang="ko-KR" altLang="en-US" b="1" u="sng" dirty="0">
                 <a:solidFill>
                   <a:srgbClr val="00B0F0"/>
                 </a:solidFill>
@@ -7074,7 +7049,7 @@
               <a:t>도망치던가</a:t>
             </a:r>
             <a:r>
-              <a:rPr lang="en-US" altLang="ko-KR" b="1" u="sng" dirty="0" smtClean="0">
+              <a:rPr lang="en-US" altLang="ko-KR" b="1" u="sng" dirty="0">
                 <a:solidFill>
                   <a:srgbClr val="00B0F0"/>
                 </a:solidFill>
@@ -7082,7 +7057,7 @@
               <a:t>, </a:t>
             </a:r>
             <a:r>
-              <a:rPr lang="ko-KR" altLang="en-US" b="1" u="sng" dirty="0" smtClean="0">
+              <a:rPr lang="ko-KR" altLang="en-US" b="1" u="sng" dirty="0">
                 <a:solidFill>
                   <a:srgbClr val="00B0F0"/>
                 </a:solidFill>
@@ -7090,11 +7065,11 @@
               <a:t>싸운다</a:t>
             </a:r>
             <a:r>
-              <a:rPr lang="ko-KR" altLang="en-US" dirty="0" smtClean="0"/>
+              <a:rPr lang="ko-KR" altLang="en-US" dirty="0"/>
               <a:t>→</a:t>
             </a:r>
             <a:r>
-              <a:rPr lang="ko-KR" altLang="en-US" b="1" u="sng" dirty="0" smtClean="0">
+              <a:rPr lang="ko-KR" altLang="en-US" b="1" u="sng" dirty="0">
                 <a:solidFill>
                   <a:schemeClr val="accent1">
                     <a:lumMod val="75000"/>
@@ -7104,7 +7079,7 @@
               <a:t>그대로 때려잡을지 </a:t>
             </a:r>
             <a:r>
-              <a:rPr lang="ko-KR" altLang="en-US" b="1" u="sng" dirty="0" err="1" smtClean="0">
+              <a:rPr lang="ko-KR" altLang="en-US" b="1" u="sng" dirty="0" err="1">
                 <a:solidFill>
                   <a:schemeClr val="accent1">
                     <a:lumMod val="75000"/>
@@ -7114,7 +7089,7 @@
               <a:t>몬스터볼을</a:t>
             </a:r>
             <a:r>
-              <a:rPr lang="ko-KR" altLang="en-US" b="1" u="sng" dirty="0" smtClean="0">
+              <a:rPr lang="ko-KR" altLang="en-US" b="1" u="sng" dirty="0">
                 <a:solidFill>
                   <a:schemeClr val="accent1">
                     <a:lumMod val="75000"/>
@@ -7123,7 +7098,7 @@
               </a:rPr>
               <a:t> 던질지 고민한다</a:t>
             </a:r>
-            <a:endParaRPr lang="en-US" altLang="ko-KR" b="1" u="sng" dirty="0" smtClean="0">
+            <a:endParaRPr lang="en-US" altLang="ko-KR" b="1" u="sng" dirty="0">
               <a:solidFill>
                 <a:schemeClr val="accent1">
                   <a:lumMod val="75000"/>
@@ -7132,60 +7107,59 @@
             </a:endParaRPr>
           </a:p>
           <a:p>
-            <a:endParaRPr lang="en-US" altLang="ko-KR" b="1" u="sng" dirty="0" smtClean="0"/>
-          </a:p>
-          <a:p>
-            <a:r>
-              <a:rPr lang="ko-KR" altLang="en-US" sz="1600" dirty="0" smtClean="0"/>
+            <a:endParaRPr lang="en-US" altLang="ko-KR" b="1" u="sng" dirty="0"/>
+          </a:p>
+          <a:p>
+            <a:r>
+              <a:rPr lang="ko-KR" altLang="en-US" sz="1600" dirty="0"/>
               <a:t>발견한 다음 싸워서 </a:t>
             </a:r>
             <a:r>
-              <a:rPr lang="ko-KR" altLang="en-US" sz="1600" dirty="0" err="1" smtClean="0"/>
+              <a:rPr lang="ko-KR" altLang="en-US" sz="1600" dirty="0" err="1"/>
               <a:t>몬스터볼을</a:t>
             </a:r>
             <a:r>
-              <a:rPr lang="ko-KR" altLang="en-US" sz="1600" dirty="0" smtClean="0"/>
+              <a:rPr lang="ko-KR" altLang="en-US" sz="1600" dirty="0"/>
               <a:t> 던질 수도 있고 도망칠 수도 있다</a:t>
             </a:r>
             <a:r>
-              <a:rPr lang="en-US" altLang="ko-KR" sz="1600" dirty="0" smtClean="0"/>
+              <a:rPr lang="en-US" altLang="ko-KR" sz="1600" dirty="0"/>
               <a:t>?? </a:t>
             </a:r>
             <a:r>
-              <a:rPr lang="ko-KR" altLang="en-US" sz="1600" dirty="0" smtClean="0"/>
+              <a:rPr lang="ko-KR" altLang="en-US" sz="1600" dirty="0"/>
               <a:t>이런 </a:t>
             </a:r>
             <a:r>
-              <a:rPr lang="en-US" altLang="ko-KR" sz="1600" dirty="0" smtClean="0"/>
+              <a:rPr lang="en-US" altLang="ko-KR" sz="1600" dirty="0"/>
               <a:t>RPG</a:t>
             </a:r>
             <a:r>
-              <a:rPr lang="ko-KR" altLang="en-US" sz="1600" dirty="0" smtClean="0"/>
+              <a:rPr lang="ko-KR" altLang="en-US" sz="1600" dirty="0"/>
               <a:t>적 </a:t>
             </a:r>
             <a:r>
-              <a:rPr lang="ko-KR" altLang="en-US" sz="1600" dirty="0" err="1" smtClean="0"/>
+              <a:rPr lang="ko-KR" altLang="en-US" sz="1600" dirty="0" err="1"/>
               <a:t>컨셉의</a:t>
             </a:r>
             <a:r>
-              <a:rPr lang="ko-KR" altLang="en-US" sz="1600" dirty="0" smtClean="0"/>
+              <a:rPr lang="ko-KR" altLang="en-US" sz="1600" dirty="0"/>
               <a:t> 게임을 슈팅게임으로 만들 수는 없을까</a:t>
             </a:r>
             <a:r>
-              <a:rPr lang="en-US" altLang="ko-KR" sz="1600" dirty="0" smtClean="0"/>
+              <a:rPr lang="en-US" altLang="ko-KR" sz="1600" dirty="0"/>
               <a:t>…?</a:t>
             </a:r>
           </a:p>
           <a:p>
             <a:r>
-              <a:rPr lang="ko-KR" altLang="en-US" sz="1700" dirty="0" smtClean="0"/>
+              <a:rPr lang="ko-KR" altLang="en-US" sz="1700" dirty="0"/>
               <a:t>→ 이렇게 고민해서 생각해낸 것이 바로 슈팅게임으로 만들자</a:t>
             </a:r>
             <a:r>
-              <a:rPr lang="en-US" altLang="ko-KR" sz="1700" dirty="0" smtClean="0"/>
+              <a:rPr lang="en-US" altLang="ko-KR" sz="1700" dirty="0"/>
               <a:t>!</a:t>
             </a:r>
-            <a:endParaRPr lang="en-US" altLang="ko-KR" sz="1700" dirty="0"/>
           </a:p>
         </p:txBody>
       </p:sp>
@@ -7194,7 +7168,7 @@
           <p:cNvPr id="9" name="사각형: 둥근 모서리 8">
             <a:extLst>
               <a:ext uri="{FF2B5EF4-FFF2-40B4-BE49-F238E27FC236}">
-                <a16:creationId xmlns="" xmlns:a16="http://schemas.microsoft.com/office/drawing/2014/main" id="{A0523FA6-B1F6-43BD-A12A-5C864B33291B}"/>
+                <a16:creationId xmlns:a16="http://schemas.microsoft.com/office/drawing/2014/main" id="{A0523FA6-B1F6-43BD-A12A-5C864B33291B}"/>
               </a:ext>
             </a:extLst>
           </p:cNvPr>
@@ -7272,7 +7246,7 @@
           <p:cNvPr id="10" name="사각형: 둥근 모서리 9">
             <a:extLst>
               <a:ext uri="{FF2B5EF4-FFF2-40B4-BE49-F238E27FC236}">
-                <a16:creationId xmlns="" xmlns:a16="http://schemas.microsoft.com/office/drawing/2014/main" id="{84E47277-03FF-4C48-9D89-E6222C45C651}"/>
+                <a16:creationId xmlns:a16="http://schemas.microsoft.com/office/drawing/2014/main" id="{84E47277-03FF-4C48-9D89-E6222C45C651}"/>
               </a:ext>
             </a:extLst>
           </p:cNvPr>
@@ -7350,7 +7324,7 @@
           <p:cNvPr id="14" name="내용 개체 틀 13">
             <a:extLst>
               <a:ext uri="{FF2B5EF4-FFF2-40B4-BE49-F238E27FC236}">
-                <a16:creationId xmlns="" xmlns:a16="http://schemas.microsoft.com/office/drawing/2014/main" id="{4BE2B102-395B-48FF-A62D-3D421F81C684}"/>
+                <a16:creationId xmlns:a16="http://schemas.microsoft.com/office/drawing/2014/main" id="{4BE2B102-395B-48FF-A62D-3D421F81C684}"/>
               </a:ext>
             </a:extLst>
           </p:cNvPr>
@@ -7384,13 +7358,6 @@
   <p:clrMapOvr>
     <a:masterClrMapping/>
   </p:clrMapOvr>
-  <p:timing>
-    <p:tnLst>
-      <p:par>
-        <p:cTn id="1" dur="indefinite" restart="never" nodeType="tmRoot"/>
-      </p:par>
-    </p:tnLst>
-  </p:timing>
 </p:sld>
 </file>
 
@@ -7416,7 +7383,7 @@
           <p:cNvPr id="2" name="제목 1">
             <a:extLst>
               <a:ext uri="{FF2B5EF4-FFF2-40B4-BE49-F238E27FC236}">
-                <a16:creationId xmlns="" xmlns:a16="http://schemas.microsoft.com/office/drawing/2014/main" id="{D4C84356-D479-4334-9194-8528CD86A250}"/>
+                <a16:creationId xmlns:a16="http://schemas.microsoft.com/office/drawing/2014/main" id="{D4C84356-D479-4334-9194-8528CD86A250}"/>
               </a:ext>
             </a:extLst>
           </p:cNvPr>
@@ -7450,7 +7417,7 @@
           <p:cNvPr id="5" name="내용 개체 틀 4">
             <a:extLst>
               <a:ext uri="{FF2B5EF4-FFF2-40B4-BE49-F238E27FC236}">
-                <a16:creationId xmlns="" xmlns:a16="http://schemas.microsoft.com/office/drawing/2014/main" id="{388A88A2-0AE2-4C0D-8E41-771A6772CDB6}"/>
+                <a16:creationId xmlns:a16="http://schemas.microsoft.com/office/drawing/2014/main" id="{388A88A2-0AE2-4C0D-8E41-771A6772CDB6}"/>
               </a:ext>
             </a:extLst>
           </p:cNvPr>
@@ -7480,21 +7447,21 @@
                 <a:gridCol w="1178511">
                   <a:extLst>
                     <a:ext uri="{9D8B030D-6E8A-4147-A177-3AD203B41FA5}">
-                      <a16:colId xmlns="" xmlns:a16="http://schemas.microsoft.com/office/drawing/2014/main" val="817937355"/>
+                      <a16:colId xmlns:a16="http://schemas.microsoft.com/office/drawing/2014/main" val="817937355"/>
                     </a:ext>
                   </a:extLst>
                 </a:gridCol>
                 <a:gridCol w="4287914">
                   <a:extLst>
                     <a:ext uri="{9D8B030D-6E8A-4147-A177-3AD203B41FA5}">
-                      <a16:colId xmlns="" xmlns:a16="http://schemas.microsoft.com/office/drawing/2014/main" val="3024832388"/>
+                      <a16:colId xmlns:a16="http://schemas.microsoft.com/office/drawing/2014/main" val="3024832388"/>
                     </a:ext>
                   </a:extLst>
                 </a:gridCol>
                 <a:gridCol w="4928524">
                   <a:extLst>
                     <a:ext uri="{9D8B030D-6E8A-4147-A177-3AD203B41FA5}">
-                      <a16:colId xmlns="" xmlns:a16="http://schemas.microsoft.com/office/drawing/2014/main" val="340120907"/>
+                      <a16:colId xmlns:a16="http://schemas.microsoft.com/office/drawing/2014/main" val="340120907"/>
                     </a:ext>
                   </a:extLst>
                 </a:gridCol>
@@ -7544,7 +7511,7 @@
                 </a:tc>
                 <a:extLst>
                   <a:ext uri="{0D108BD9-81ED-4DB2-BD59-A6C34878D82A}">
-                    <a16:rowId xmlns="" xmlns:a16="http://schemas.microsoft.com/office/drawing/2014/main" val="423171857"/>
+                    <a16:rowId xmlns:a16="http://schemas.microsoft.com/office/drawing/2014/main" val="423171857"/>
                   </a:ext>
                 </a:extLst>
               </a:tr>
@@ -7624,17 +7591,13 @@
                     </a:p>
                     <a:p>
                       <a:pPr algn="ctr" latinLnBrk="1"/>
-                      <a:endParaRPr lang="en-US" altLang="ko-KR" sz="1400" dirty="0" smtClean="0"/>
+                      <a:endParaRPr lang="en-US" altLang="ko-KR" sz="1400" dirty="0"/>
                     </a:p>
                     <a:p>
                       <a:pPr algn="ctr" latinLnBrk="1"/>
                       <a:r>
-                        <a:rPr lang="ko-KR" altLang="en-US" sz="1400" dirty="0" smtClean="0"/>
-                        <a:t>키보드로 </a:t>
-                      </a:r>
-                      <a:r>
                         <a:rPr lang="ko-KR" altLang="en-US" sz="1400" dirty="0"/>
-                        <a:t>입력 시 캐릭터가 특정방향으로 이동</a:t>
+                        <a:t>키보드로 입력 시 캐릭터가 특정방향으로 이동</a:t>
                       </a:r>
                     </a:p>
                   </a:txBody>
@@ -7658,17 +7621,13 @@
                     </a:p>
                     <a:p>
                       <a:pPr algn="ctr" latinLnBrk="1"/>
-                      <a:endParaRPr lang="en-US" altLang="ko-KR" sz="1400" dirty="0" smtClean="0"/>
+                      <a:endParaRPr lang="en-US" altLang="ko-KR" sz="1400" dirty="0"/>
                     </a:p>
                     <a:p>
                       <a:pPr algn="ctr" latinLnBrk="1"/>
                       <a:r>
-                        <a:rPr lang="ko-KR" altLang="en-US" sz="1400" dirty="0" smtClean="0"/>
-                        <a:t>마우스 </a:t>
-                      </a:r>
-                      <a:r>
                         <a:rPr lang="ko-KR" altLang="en-US" sz="1400" dirty="0"/>
-                        <a:t>이동 시 캐릭터가 마우스 방향으로 이동</a:t>
+                        <a:t>마우스 이동 시 캐릭터가 마우스 방향으로 이동</a:t>
                       </a:r>
                     </a:p>
                   </a:txBody>
@@ -7676,7 +7635,7 @@
                 </a:tc>
                 <a:extLst>
                   <a:ext uri="{0D108BD9-81ED-4DB2-BD59-A6C34878D82A}">
-                    <a16:rowId xmlns="" xmlns:a16="http://schemas.microsoft.com/office/drawing/2014/main" val="4159277651"/>
+                    <a16:rowId xmlns:a16="http://schemas.microsoft.com/office/drawing/2014/main" val="4159277651"/>
                   </a:ext>
                 </a:extLst>
               </a:tr>
@@ -7729,12 +7688,12 @@
                     </a:p>
                     <a:p>
                       <a:pPr algn="ctr" latinLnBrk="1"/>
-                      <a:endParaRPr lang="en-US" altLang="ko-KR" sz="1400" dirty="0" smtClean="0"/>
+                      <a:endParaRPr lang="en-US" altLang="ko-KR" sz="1400" dirty="0"/>
                     </a:p>
                     <a:p>
                       <a:pPr algn="ctr" latinLnBrk="1"/>
                       <a:r>
-                        <a:rPr lang="en-US" altLang="ko-KR" sz="1400" dirty="0" smtClean="0"/>
+                        <a:rPr lang="en-US" altLang="ko-KR" sz="1400" dirty="0"/>
                         <a:t>S</a:t>
                       </a:r>
                       <a:r>
@@ -7755,13 +7714,8 @@
                       </a:r>
                       <a:r>
                         <a:rPr lang="ko-KR" altLang="en-US" sz="1400" dirty="0"/>
-                        <a:t> </a:t>
-                      </a:r>
-                      <a:r>
-                        <a:rPr lang="ko-KR" altLang="en-US" sz="1400" dirty="0" smtClean="0"/>
-                        <a:t>사용</a:t>
-                      </a:r>
-                      <a:endParaRPr lang="ko-KR" altLang="en-US" sz="1400" dirty="0"/>
+                        <a:t> 사용</a:t>
+                      </a:r>
                     </a:p>
                   </a:txBody>
                   <a:tcPr/>
@@ -7791,21 +7745,17 @@
                     </a:p>
                     <a:p>
                       <a:pPr algn="ctr" latinLnBrk="1"/>
-                      <a:endParaRPr lang="en-US" altLang="ko-KR" sz="1400" dirty="0" smtClean="0"/>
+                      <a:endParaRPr lang="en-US" altLang="ko-KR" sz="1400" dirty="0"/>
                     </a:p>
                     <a:p>
                       <a:pPr algn="ctr" latinLnBrk="1"/>
                       <a:r>
-                        <a:rPr lang="ko-KR" altLang="en-US" sz="1400" dirty="0" err="1" smtClean="0"/>
+                        <a:rPr lang="ko-KR" altLang="en-US" sz="1400" dirty="0" err="1"/>
                         <a:t>필살기처럼</a:t>
                       </a:r>
                       <a:r>
-                        <a:rPr lang="ko-KR" altLang="en-US" sz="1400" dirty="0" smtClean="0"/>
-                        <a:t>  </a:t>
-                      </a:r>
-                      <a:r>
                         <a:rPr lang="ko-KR" altLang="en-US" sz="1400" dirty="0"/>
-                        <a:t>횟수제한 및 제한시간을 걸어둔다</a:t>
+                        <a:t>  횟수제한 및 제한시간을 걸어둔다</a:t>
                       </a:r>
                       <a:endParaRPr lang="en-US" altLang="ko-KR" sz="1400" dirty="0"/>
                     </a:p>
@@ -7814,7 +7764,7 @@
                 </a:tc>
                 <a:extLst>
                   <a:ext uri="{0D108BD9-81ED-4DB2-BD59-A6C34878D82A}">
-                    <a16:rowId xmlns="" xmlns:a16="http://schemas.microsoft.com/office/drawing/2014/main" val="4294934032"/>
+                    <a16:rowId xmlns:a16="http://schemas.microsoft.com/office/drawing/2014/main" val="4294934032"/>
                   </a:ext>
                 </a:extLst>
               </a:tr>
@@ -7845,38 +7795,34 @@
                       </a:r>
                       <a:r>
                         <a:rPr lang="ko-KR" altLang="en-US" sz="1400" dirty="0"/>
-                        <a:t>개의 </a:t>
-                      </a:r>
-                      <a:r>
-                        <a:rPr lang="ko-KR" altLang="en-US" sz="1400" dirty="0" smtClean="0"/>
-                        <a:t>스테이지</a:t>
-                      </a:r>
-                      <a:r>
-                        <a:rPr lang="en-US" altLang="ko-KR" sz="1400" dirty="0" smtClean="0"/>
+                        <a:t>개의 스테이지</a:t>
+                      </a:r>
+                      <a:r>
+                        <a:rPr lang="en-US" altLang="ko-KR" sz="1400" dirty="0"/>
                         <a:t> </a:t>
                       </a:r>
                       <a:r>
-                        <a:rPr lang="ko-KR" altLang="en-US" sz="1400" dirty="0" smtClean="0"/>
+                        <a:rPr lang="ko-KR" altLang="en-US" sz="1400" dirty="0"/>
                         <a:t>→  파이어</a:t>
                       </a:r>
                       <a:r>
-                        <a:rPr lang="en-US" altLang="ko-KR" sz="1400" dirty="0" smtClean="0"/>
+                        <a:rPr lang="en-US" altLang="ko-KR" sz="1400" dirty="0"/>
                         <a:t>, </a:t>
                       </a:r>
                       <a:r>
-                        <a:rPr lang="ko-KR" altLang="en-US" sz="1400" dirty="0" err="1" smtClean="0"/>
+                        <a:rPr lang="ko-KR" altLang="en-US" sz="1400" dirty="0" err="1"/>
                         <a:t>프리져</a:t>
                       </a:r>
                       <a:r>
-                        <a:rPr lang="en-US" altLang="ko-KR" sz="1400" dirty="0" smtClean="0"/>
+                        <a:rPr lang="en-US" altLang="ko-KR" sz="1400" dirty="0"/>
                         <a:t>,</a:t>
                       </a:r>
                       <a:r>
-                        <a:rPr lang="ko-KR" altLang="en-US" sz="1400" dirty="0" smtClean="0"/>
+                        <a:rPr lang="ko-KR" altLang="en-US" sz="1400" dirty="0"/>
                         <a:t> </a:t>
                       </a:r>
                       <a:r>
-                        <a:rPr lang="ko-KR" altLang="en-US" sz="1400" dirty="0" err="1" smtClean="0"/>
+                        <a:rPr lang="ko-KR" altLang="en-US" sz="1400" dirty="0" err="1"/>
                         <a:t>썬더</a:t>
                       </a:r>
                       <a:endParaRPr lang="ko-KR" altLang="en-US" sz="1400" dirty="0"/>
@@ -7897,7 +7843,7 @@
                 </a:tc>
                 <a:extLst>
                   <a:ext uri="{0D108BD9-81ED-4DB2-BD59-A6C34878D82A}">
-                    <a16:rowId xmlns="" xmlns:a16="http://schemas.microsoft.com/office/drawing/2014/main" val="2980042143"/>
+                    <a16:rowId xmlns:a16="http://schemas.microsoft.com/office/drawing/2014/main" val="2980042143"/>
                   </a:ext>
                 </a:extLst>
               </a:tr>
@@ -7952,11 +7898,7 @@
                       </a:r>
                       <a:r>
                         <a:rPr lang="ko-KR" altLang="en-US" sz="1400" dirty="0"/>
-                        <a:t> </a:t>
-                      </a:r>
-                      <a:r>
-                        <a:rPr lang="ko-KR" altLang="en-US" sz="1400" dirty="0" smtClean="0"/>
-                        <a:t>구현한다</a:t>
+                        <a:t> 구현한다</a:t>
                       </a:r>
                       <a:endParaRPr lang="en-US" altLang="ko-KR" sz="1400" dirty="0"/>
                     </a:p>
@@ -7965,7 +7907,7 @@
                 </a:tc>
                 <a:extLst>
                   <a:ext uri="{0D108BD9-81ED-4DB2-BD59-A6C34878D82A}">
-                    <a16:rowId xmlns="" xmlns:a16="http://schemas.microsoft.com/office/drawing/2014/main" val="3478069844"/>
+                    <a16:rowId xmlns:a16="http://schemas.microsoft.com/office/drawing/2014/main" val="3478069844"/>
                   </a:ext>
                 </a:extLst>
               </a:tr>
@@ -7983,13 +7925,6 @@
   <p:clrMapOvr>
     <a:masterClrMapping/>
   </p:clrMapOvr>
-  <p:timing>
-    <p:tnLst>
-      <p:par>
-        <p:cTn id="1" dur="indefinite" restart="never" nodeType="tmRoot"/>
-      </p:par>
-    </p:tnLst>
-  </p:timing>
 </p:sld>
 </file>
 
@@ -8015,7 +7950,7 @@
           <p:cNvPr id="2" name="제목 1">
             <a:extLst>
               <a:ext uri="{FF2B5EF4-FFF2-40B4-BE49-F238E27FC236}">
-                <a16:creationId xmlns="" xmlns:a16="http://schemas.microsoft.com/office/drawing/2014/main" id="{D4C84356-D479-4334-9194-8528CD86A250}"/>
+                <a16:creationId xmlns:a16="http://schemas.microsoft.com/office/drawing/2014/main" id="{D4C84356-D479-4334-9194-8528CD86A250}"/>
               </a:ext>
             </a:extLst>
           </p:cNvPr>
@@ -8049,7 +7984,7 @@
           <p:cNvPr id="5" name="내용 개체 틀 4">
             <a:extLst>
               <a:ext uri="{FF2B5EF4-FFF2-40B4-BE49-F238E27FC236}">
-                <a16:creationId xmlns="" xmlns:a16="http://schemas.microsoft.com/office/drawing/2014/main" id="{388A88A2-0AE2-4C0D-8E41-771A6772CDB6}"/>
+                <a16:creationId xmlns:a16="http://schemas.microsoft.com/office/drawing/2014/main" id="{388A88A2-0AE2-4C0D-8E41-771A6772CDB6}"/>
               </a:ext>
             </a:extLst>
           </p:cNvPr>
@@ -8079,21 +8014,21 @@
                 <a:gridCol w="1178511">
                   <a:extLst>
                     <a:ext uri="{9D8B030D-6E8A-4147-A177-3AD203B41FA5}">
-                      <a16:colId xmlns="" xmlns:a16="http://schemas.microsoft.com/office/drawing/2014/main" val="817937355"/>
+                      <a16:colId xmlns:a16="http://schemas.microsoft.com/office/drawing/2014/main" val="817937355"/>
                     </a:ext>
                   </a:extLst>
                 </a:gridCol>
                 <a:gridCol w="4287914">
                   <a:extLst>
                     <a:ext uri="{9D8B030D-6E8A-4147-A177-3AD203B41FA5}">
-                      <a16:colId xmlns="" xmlns:a16="http://schemas.microsoft.com/office/drawing/2014/main" val="3024832388"/>
+                      <a16:colId xmlns:a16="http://schemas.microsoft.com/office/drawing/2014/main" val="3024832388"/>
                     </a:ext>
                   </a:extLst>
                 </a:gridCol>
                 <a:gridCol w="4928524">
                   <a:extLst>
                     <a:ext uri="{9D8B030D-6E8A-4147-A177-3AD203B41FA5}">
-                      <a16:colId xmlns="" xmlns:a16="http://schemas.microsoft.com/office/drawing/2014/main" val="340120907"/>
+                      <a16:colId xmlns:a16="http://schemas.microsoft.com/office/drawing/2014/main" val="340120907"/>
                     </a:ext>
                   </a:extLst>
                 </a:gridCol>
@@ -8143,7 +8078,7 @@
                 </a:tc>
                 <a:extLst>
                   <a:ext uri="{0D108BD9-81ED-4DB2-BD59-A6C34878D82A}">
-                    <a16:rowId xmlns="" xmlns:a16="http://schemas.microsoft.com/office/drawing/2014/main" val="423171857"/>
+                    <a16:rowId xmlns:a16="http://schemas.microsoft.com/office/drawing/2014/main" val="423171857"/>
                   </a:ext>
                 </a:extLst>
               </a:tr>
@@ -8170,62 +8105,34 @@
                       <a:pPr algn="ctr" latinLnBrk="1"/>
                       <a:r>
                         <a:rPr lang="ko-KR" altLang="en-US" sz="1400" dirty="0"/>
-                        <a:t>아이템  </a:t>
-                      </a:r>
-                      <a:r>
-                        <a:rPr lang="ko-KR" altLang="en-US" sz="1400" dirty="0" smtClean="0"/>
-                        <a:t>구현</a:t>
-                      </a:r>
-                      <a:endParaRPr lang="en-US" altLang="ko-KR" sz="1400" dirty="0" smtClean="0"/>
-                    </a:p>
-                    <a:p>
-                      <a:pPr algn="ctr" latinLnBrk="1"/>
-                      <a:r>
-                        <a:rPr lang="en-US" altLang="ko-KR" sz="1400" dirty="0" smtClean="0"/>
-                        <a:t> </a:t>
-                      </a:r>
-                    </a:p>
-                    <a:p>
-                      <a:pPr algn="ctr" latinLnBrk="1"/>
-                      <a:r>
-                        <a:rPr lang="ko-KR" altLang="en-US" sz="1400" dirty="0" smtClean="0"/>
-                        <a:t>캐릭터가 </a:t>
-                      </a:r>
-                      <a:r>
-                        <a:rPr lang="ko-KR" altLang="en-US" sz="1400" dirty="0"/>
-                        <a:t>적과 접촉 및 적이 쏜 탄에 </a:t>
-                      </a:r>
-                      <a:r>
-                        <a:rPr lang="ko-KR" altLang="en-US" sz="1400" dirty="0" smtClean="0"/>
-                        <a:t>접촉 시 </a:t>
-                      </a:r>
-                      <a:r>
-                        <a:rPr lang="ko-KR" altLang="en-US" sz="1400" dirty="0"/>
-                        <a:t>죽는다</a:t>
+                        <a:t>아이템  구현</a:t>
                       </a:r>
                       <a:endParaRPr lang="en-US" altLang="ko-KR" sz="1400" dirty="0"/>
                     </a:p>
                     <a:p>
                       <a:pPr algn="ctr" latinLnBrk="1"/>
-                      <a:endParaRPr lang="en-US" altLang="ko-KR" sz="1400" dirty="0" smtClean="0"/>
+                      <a:r>
+                        <a:rPr lang="en-US" altLang="ko-KR" sz="1400" dirty="0"/>
+                        <a:t> </a:t>
+                      </a:r>
                     </a:p>
                     <a:p>
                       <a:pPr algn="ctr" latinLnBrk="1"/>
                       <a:r>
-                        <a:rPr lang="ko-KR" altLang="en-US" sz="1400" dirty="0" smtClean="0"/>
-                        <a:t>캐릭터가 </a:t>
-                      </a:r>
-                      <a:r>
                         <a:rPr lang="ko-KR" altLang="en-US" sz="1400" dirty="0"/>
-                        <a:t>적이나 보스를 </a:t>
-                      </a:r>
-                      <a:r>
-                        <a:rPr lang="ko-KR" altLang="en-US" sz="1400" dirty="0" smtClean="0"/>
-                        <a:t>죽일 시 </a:t>
-                      </a:r>
+                        <a:t>캐릭터가 적과 접촉 및 적이 쏜 탄에 접촉 시 죽는다</a:t>
+                      </a:r>
+                      <a:endParaRPr lang="en-US" altLang="ko-KR" sz="1400" dirty="0"/>
+                    </a:p>
+                    <a:p>
+                      <a:pPr algn="ctr" latinLnBrk="1"/>
+                      <a:endParaRPr lang="en-US" altLang="ko-KR" sz="1400" dirty="0"/>
+                    </a:p>
+                    <a:p>
+                      <a:pPr algn="ctr" latinLnBrk="1"/>
                       <a:r>
                         <a:rPr lang="ko-KR" altLang="en-US" sz="1400" dirty="0"/>
-                        <a:t>점수를 얻는다</a:t>
+                        <a:t>캐릭터가 적이나 보스를 죽일 시 점수를 얻는다</a:t>
                       </a:r>
                       <a:endParaRPr lang="en-US" altLang="ko-KR" sz="1400" dirty="0"/>
                     </a:p>
@@ -8247,12 +8154,8 @@
                         <a:t>0</a:t>
                       </a:r>
                       <a:r>
-                        <a:rPr lang="ko-KR" altLang="en-US" sz="1400" dirty="0" smtClean="0"/>
-                        <a:t>이 될 </a:t>
-                      </a:r>
-                      <a:r>
                         <a:rPr lang="ko-KR" altLang="en-US" sz="1400" dirty="0"/>
-                        <a:t>시 죽게 만든다</a:t>
+                        <a:t>이 될 시 죽게 만든다</a:t>
                       </a:r>
                       <a:endParaRPr lang="en-US" altLang="ko-KR" sz="1400" dirty="0"/>
                     </a:p>
@@ -8261,7 +8164,7 @@
                 </a:tc>
                 <a:extLst>
                   <a:ext uri="{0D108BD9-81ED-4DB2-BD59-A6C34878D82A}">
-                    <a16:rowId xmlns="" xmlns:a16="http://schemas.microsoft.com/office/drawing/2014/main" val="4294934032"/>
+                    <a16:rowId xmlns:a16="http://schemas.microsoft.com/office/drawing/2014/main" val="4294934032"/>
                   </a:ext>
                 </a:extLst>
               </a:tr>
@@ -8287,15 +8190,15 @@
                     <a:p>
                       <a:pPr algn="ctr" latinLnBrk="1"/>
                       <a:r>
-                        <a:rPr lang="ko-KR" altLang="en-US" sz="1400" dirty="0" err="1" smtClean="0"/>
+                        <a:rPr lang="ko-KR" altLang="en-US" sz="1400" dirty="0" err="1"/>
                         <a:t>배경음</a:t>
                       </a:r>
                       <a:r>
-                        <a:rPr lang="ko-KR" altLang="en-US" sz="1400" dirty="0" smtClean="0"/>
+                        <a:rPr lang="ko-KR" altLang="en-US" sz="1400" dirty="0"/>
                         <a:t> </a:t>
                       </a:r>
                       <a:r>
-                        <a:rPr lang="en-US" altLang="ko-KR" sz="1400" dirty="0" smtClean="0"/>
+                        <a:rPr lang="en-US" altLang="ko-KR" sz="1400" dirty="0"/>
                         <a:t>, </a:t>
                       </a:r>
                       <a:r>
@@ -8303,46 +8206,37 @@
                         <a:t>스테이지 </a:t>
                       </a:r>
                       <a:r>
-                        <a:rPr lang="ko-KR" altLang="en-US" sz="1400" dirty="0" err="1" smtClean="0"/>
+                        <a:rPr lang="ko-KR" altLang="en-US" sz="1400" dirty="0" err="1"/>
                         <a:t>클리어</a:t>
                       </a:r>
                       <a:r>
-                        <a:rPr lang="ko-KR" altLang="en-US" sz="1400" dirty="0" smtClean="0"/>
+                        <a:rPr lang="ko-KR" altLang="en-US" sz="1400" dirty="0"/>
                         <a:t> </a:t>
                       </a:r>
                       <a:r>
-                        <a:rPr lang="en-US" altLang="ko-KR" sz="1400" dirty="0" smtClean="0"/>
+                        <a:rPr lang="en-US" altLang="ko-KR" sz="1400" dirty="0"/>
                         <a:t>, </a:t>
                       </a:r>
                       <a:r>
                         <a:rPr lang="ko-KR" altLang="en-US" sz="1400" dirty="0"/>
-                        <a:t>탄 </a:t>
-                      </a:r>
-                      <a:r>
-                        <a:rPr lang="ko-KR" altLang="en-US" sz="1400" dirty="0" smtClean="0"/>
-                        <a:t>발사 </a:t>
-                      </a:r>
-                      <a:r>
-                        <a:rPr lang="en-US" altLang="ko-KR" sz="1400" dirty="0" smtClean="0"/>
+                        <a:t>탄 발사 </a:t>
+                      </a:r>
+                      <a:r>
+                        <a:rPr lang="en-US" altLang="ko-KR" sz="1400" dirty="0"/>
                         <a:t>, </a:t>
                       </a:r>
                       <a:r>
-                        <a:rPr lang="ko-KR" altLang="en-US" sz="1400" dirty="0" smtClean="0"/>
+                        <a:rPr lang="ko-KR" altLang="en-US" sz="1400" dirty="0"/>
                         <a:t>시작 </a:t>
                       </a:r>
                       <a:r>
-                        <a:rPr lang="en-US" altLang="ko-KR" sz="1400" dirty="0" smtClean="0"/>
+                        <a:rPr lang="en-US" altLang="ko-KR" sz="1400" dirty="0"/>
                         <a:t>, </a:t>
                       </a:r>
                       <a:r>
                         <a:rPr lang="ko-KR" altLang="en-US" sz="1400" dirty="0"/>
-                        <a:t>사망 </a:t>
-                      </a:r>
-                      <a:r>
-                        <a:rPr lang="ko-KR" altLang="en-US" sz="1400" dirty="0" smtClean="0"/>
-                        <a:t>등</a:t>
-                      </a:r>
-                      <a:endParaRPr lang="ko-KR" altLang="en-US" sz="1400" dirty="0"/>
+                        <a:t>사망 등</a:t>
+                      </a:r>
                     </a:p>
                   </a:txBody>
                   <a:tcPr/>
@@ -8360,7 +8254,7 @@
                 </a:tc>
                 <a:extLst>
                   <a:ext uri="{0D108BD9-81ED-4DB2-BD59-A6C34878D82A}">
-                    <a16:rowId xmlns="" xmlns:a16="http://schemas.microsoft.com/office/drawing/2014/main" val="2980042143"/>
+                    <a16:rowId xmlns:a16="http://schemas.microsoft.com/office/drawing/2014/main" val="2980042143"/>
                   </a:ext>
                 </a:extLst>
               </a:tr>
@@ -8387,14 +8281,10 @@
                       <a:pPr algn="ctr" latinLnBrk="1"/>
                       <a:r>
                         <a:rPr lang="ko-KR" altLang="en-US" sz="1400" dirty="0"/>
-                        <a:t>기존의 캐릭터 및 적의 </a:t>
-                      </a:r>
-                      <a:r>
-                        <a:rPr lang="ko-KR" altLang="en-US" sz="1400" dirty="0" smtClean="0"/>
-                        <a:t>움직임 </a:t>
-                      </a:r>
-                      <a:r>
-                        <a:rPr lang="en-US" altLang="ko-KR" sz="1400" dirty="0" smtClean="0"/>
+                        <a:t>기존의 캐릭터 및 적의 움직임 </a:t>
+                      </a:r>
+                      <a:r>
+                        <a:rPr lang="en-US" altLang="ko-KR" sz="1400" dirty="0"/>
                         <a:t>, </a:t>
                       </a:r>
                       <a:r>
@@ -8402,32 +8292,28 @@
                         <a:t>탄 발사</a:t>
                       </a:r>
                       <a:r>
-                        <a:rPr lang="en-US" altLang="ko-KR" sz="1400" dirty="0" smtClean="0"/>
+                        <a:rPr lang="en-US" altLang="ko-KR" sz="1400" dirty="0"/>
                         <a:t>,   </a:t>
                       </a:r>
                       <a:r>
-                        <a:rPr lang="ko-KR" altLang="en-US" sz="1400" dirty="0" smtClean="0"/>
+                        <a:rPr lang="ko-KR" altLang="en-US" sz="1400" dirty="0"/>
                         <a:t>사망 </a:t>
                       </a:r>
                       <a:r>
-                        <a:rPr lang="en-US" altLang="ko-KR" sz="1400" dirty="0" smtClean="0"/>
+                        <a:rPr lang="en-US" altLang="ko-KR" sz="1400" dirty="0"/>
                         <a:t>, </a:t>
                       </a:r>
                       <a:r>
-                        <a:rPr lang="ko-KR" altLang="en-US" sz="1400" dirty="0" smtClean="0"/>
+                        <a:rPr lang="ko-KR" altLang="en-US" sz="1400" dirty="0"/>
                         <a:t>필살기사용 </a:t>
                       </a:r>
                       <a:r>
-                        <a:rPr lang="en-US" altLang="ko-KR" sz="1400" dirty="0" smtClean="0"/>
+                        <a:rPr lang="en-US" altLang="ko-KR" sz="1400" dirty="0"/>
                         <a:t>, </a:t>
                       </a:r>
                       <a:r>
                         <a:rPr lang="ko-KR" altLang="en-US" sz="1400" dirty="0"/>
-                        <a:t>도우미 </a:t>
-                      </a:r>
-                      <a:r>
-                        <a:rPr lang="ko-KR" altLang="en-US" sz="1400" dirty="0" smtClean="0"/>
-                        <a:t>등 </a:t>
+                        <a:t>도우미 등 </a:t>
                       </a:r>
                       <a:endParaRPr lang="en-US" altLang="ko-KR" sz="1400" dirty="0"/>
                     </a:p>
@@ -8447,7 +8333,7 @@
                 </a:tc>
                 <a:extLst>
                   <a:ext uri="{0D108BD9-81ED-4DB2-BD59-A6C34878D82A}">
-                    <a16:rowId xmlns="" xmlns:a16="http://schemas.microsoft.com/office/drawing/2014/main" val="3478069844"/>
+                    <a16:rowId xmlns:a16="http://schemas.microsoft.com/office/drawing/2014/main" val="3478069844"/>
                   </a:ext>
                 </a:extLst>
               </a:tr>
@@ -8465,13 +8351,6 @@
   <p:clrMapOvr>
     <a:masterClrMapping/>
   </p:clrMapOvr>
-  <p:timing>
-    <p:tnLst>
-      <p:par>
-        <p:cTn id="1" dur="indefinite" restart="never" nodeType="tmRoot"/>
-      </p:par>
-    </p:tnLst>
-  </p:timing>
 </p:sld>
 </file>
 
@@ -8497,7 +8376,7 @@
           <p:cNvPr id="2" name="제목 1">
             <a:extLst>
               <a:ext uri="{FF2B5EF4-FFF2-40B4-BE49-F238E27FC236}">
-                <a16:creationId xmlns="" xmlns:a16="http://schemas.microsoft.com/office/drawing/2014/main" id="{FE884EB6-1564-498D-84F5-751228173182}"/>
+                <a16:creationId xmlns:a16="http://schemas.microsoft.com/office/drawing/2014/main" id="{FE884EB6-1564-498D-84F5-751228173182}"/>
               </a:ext>
             </a:extLst>
           </p:cNvPr>
@@ -8526,7 +8405,7 @@
           <p:cNvPr id="9" name="내용 개체 틀 8">
             <a:extLst>
               <a:ext uri="{FF2B5EF4-FFF2-40B4-BE49-F238E27FC236}">
-                <a16:creationId xmlns="" xmlns:a16="http://schemas.microsoft.com/office/drawing/2014/main" id="{FFA5F613-52CF-419F-A2BD-7FDA6B69289B}"/>
+                <a16:creationId xmlns:a16="http://schemas.microsoft.com/office/drawing/2014/main" id="{FFA5F613-52CF-419F-A2BD-7FDA6B69289B}"/>
               </a:ext>
             </a:extLst>
           </p:cNvPr>
@@ -8555,7 +8434,7 @@
           <p:cNvPr id="1026" name="Picture 2" descr="텐가이 메인메뉴에 대한 이미지 검색결과">
             <a:extLst>
               <a:ext uri="{FF2B5EF4-FFF2-40B4-BE49-F238E27FC236}">
-                <a16:creationId xmlns="" xmlns:a16="http://schemas.microsoft.com/office/drawing/2014/main" id="{5424B36E-7F3A-42B0-9D6B-2C116C1E26F7}"/>
+                <a16:creationId xmlns:a16="http://schemas.microsoft.com/office/drawing/2014/main" id="{5424B36E-7F3A-42B0-9D6B-2C116C1E26F7}"/>
               </a:ext>
             </a:extLst>
           </p:cNvPr>
@@ -8602,7 +8481,7 @@
           <p:cNvPr id="11" name="사각형: 둥근 모서리 10">
             <a:extLst>
               <a:ext uri="{FF2B5EF4-FFF2-40B4-BE49-F238E27FC236}">
-                <a16:creationId xmlns="" xmlns:a16="http://schemas.microsoft.com/office/drawing/2014/main" id="{B3122D12-6938-44CE-B36C-B451259DE9E1}"/>
+                <a16:creationId xmlns:a16="http://schemas.microsoft.com/office/drawing/2014/main" id="{B3122D12-6938-44CE-B36C-B451259DE9E1}"/>
               </a:ext>
             </a:extLst>
           </p:cNvPr>
@@ -8695,7 +8574,7 @@
           <p:cNvPr id="12" name="사각형: 둥근 모서리 11">
             <a:extLst>
               <a:ext uri="{FF2B5EF4-FFF2-40B4-BE49-F238E27FC236}">
-                <a16:creationId xmlns="" xmlns:a16="http://schemas.microsoft.com/office/drawing/2014/main" id="{4AAE734A-AB91-4F89-9A8C-561522DE1460}"/>
+                <a16:creationId xmlns:a16="http://schemas.microsoft.com/office/drawing/2014/main" id="{4AAE734A-AB91-4F89-9A8C-561522DE1460}"/>
               </a:ext>
             </a:extLst>
           </p:cNvPr>
@@ -8780,13 +8659,6 @@
   <p:clrMapOvr>
     <a:masterClrMapping/>
   </p:clrMapOvr>
-  <p:timing>
-    <p:tnLst>
-      <p:par>
-        <p:cTn id="1" dur="indefinite" restart="never" nodeType="tmRoot"/>
-      </p:par>
-    </p:tnLst>
-  </p:timing>
 </p:sld>
 </file>
 
@@ -8812,7 +8684,7 @@
           <p:cNvPr id="2" name="제목 1">
             <a:extLst>
               <a:ext uri="{FF2B5EF4-FFF2-40B4-BE49-F238E27FC236}">
-                <a16:creationId xmlns="" xmlns:a16="http://schemas.microsoft.com/office/drawing/2014/main" id="{527DE3EE-D026-4AFD-B371-94A0638E4A60}"/>
+                <a16:creationId xmlns:a16="http://schemas.microsoft.com/office/drawing/2014/main" id="{527DE3EE-D026-4AFD-B371-94A0638E4A60}"/>
               </a:ext>
             </a:extLst>
           </p:cNvPr>
@@ -8841,7 +8713,7 @@
           <p:cNvPr id="4" name="내용 개체 틀 3">
             <a:extLst>
               <a:ext uri="{FF2B5EF4-FFF2-40B4-BE49-F238E27FC236}">
-                <a16:creationId xmlns="" xmlns:a16="http://schemas.microsoft.com/office/drawing/2014/main" id="{44C2CDEF-3923-489F-A7CD-D22235D320BC}"/>
+                <a16:creationId xmlns:a16="http://schemas.microsoft.com/office/drawing/2014/main" id="{44C2CDEF-3923-489F-A7CD-D22235D320BC}"/>
               </a:ext>
             </a:extLst>
           </p:cNvPr>
@@ -8879,7 +8751,7 @@
           <p:cNvPr id="5" name="그림 4">
             <a:extLst>
               <a:ext uri="{FF2B5EF4-FFF2-40B4-BE49-F238E27FC236}">
-                <a16:creationId xmlns="" xmlns:a16="http://schemas.microsoft.com/office/drawing/2014/main" id="{D4AC71B2-7519-43DB-8841-7EC10D2F1FD1}"/>
+                <a16:creationId xmlns:a16="http://schemas.microsoft.com/office/drawing/2014/main" id="{D4AC71B2-7519-43DB-8841-7EC10D2F1FD1}"/>
               </a:ext>
             </a:extLst>
           </p:cNvPr>
@@ -8915,7 +8787,7 @@
           <p:cNvPr id="7" name="그림 6">
             <a:extLst>
               <a:ext uri="{FF2B5EF4-FFF2-40B4-BE49-F238E27FC236}">
-                <a16:creationId xmlns="" xmlns:a16="http://schemas.microsoft.com/office/drawing/2014/main" id="{A2C46E07-AAB4-4E6E-9DBF-6A591291FE0F}"/>
+                <a16:creationId xmlns:a16="http://schemas.microsoft.com/office/drawing/2014/main" id="{A2C46E07-AAB4-4E6E-9DBF-6A591291FE0F}"/>
               </a:ext>
             </a:extLst>
           </p:cNvPr>
@@ -8951,7 +8823,7 @@
           <p:cNvPr id="8" name="사각형: 둥근 모서리 7">
             <a:extLst>
               <a:ext uri="{FF2B5EF4-FFF2-40B4-BE49-F238E27FC236}">
-                <a16:creationId xmlns="" xmlns:a16="http://schemas.microsoft.com/office/drawing/2014/main" id="{2CD9E68B-66C9-480D-823A-1B7BFDDE67BE}"/>
+                <a16:creationId xmlns:a16="http://schemas.microsoft.com/office/drawing/2014/main" id="{2CD9E68B-66C9-480D-823A-1B7BFDDE67BE}"/>
               </a:ext>
             </a:extLst>
           </p:cNvPr>
@@ -9044,7 +8916,7 @@
           <p:cNvPr id="9" name="사각형: 둥근 모서리 8">
             <a:extLst>
               <a:ext uri="{FF2B5EF4-FFF2-40B4-BE49-F238E27FC236}">
-                <a16:creationId xmlns="" xmlns:a16="http://schemas.microsoft.com/office/drawing/2014/main" id="{4C620D92-83A6-4FCE-8F4F-342D051F3B2B}"/>
+                <a16:creationId xmlns:a16="http://schemas.microsoft.com/office/drawing/2014/main" id="{4C620D92-83A6-4FCE-8F4F-342D051F3B2B}"/>
               </a:ext>
             </a:extLst>
           </p:cNvPr>
@@ -9119,7 +8991,7 @@
           <p:cNvPr id="10" name="사각형: 둥근 모서리 9">
             <a:extLst>
               <a:ext uri="{FF2B5EF4-FFF2-40B4-BE49-F238E27FC236}">
-                <a16:creationId xmlns="" xmlns:a16="http://schemas.microsoft.com/office/drawing/2014/main" id="{AAD7DD6E-8D2D-4D0F-9969-156CB4D4EDB0}"/>
+                <a16:creationId xmlns:a16="http://schemas.microsoft.com/office/drawing/2014/main" id="{AAD7DD6E-8D2D-4D0F-9969-156CB4D4EDB0}"/>
               </a:ext>
             </a:extLst>
           </p:cNvPr>
@@ -9199,13 +9071,6 @@
   <p:clrMapOvr>
     <a:masterClrMapping/>
   </p:clrMapOvr>
-  <p:timing>
-    <p:tnLst>
-      <p:par>
-        <p:cTn id="1" dur="indefinite" restart="never" nodeType="tmRoot"/>
-      </p:par>
-    </p:tnLst>
-  </p:timing>
 </p:sld>
 </file>
 
@@ -9231,7 +9096,7 @@
           <p:cNvPr id="2" name="제목 1">
             <a:extLst>
               <a:ext uri="{FF2B5EF4-FFF2-40B4-BE49-F238E27FC236}">
-                <a16:creationId xmlns="" xmlns:a16="http://schemas.microsoft.com/office/drawing/2014/main" id="{BE03EE3C-4EE4-4D64-9C99-4E888DB02C2A}"/>
+                <a16:creationId xmlns:a16="http://schemas.microsoft.com/office/drawing/2014/main" id="{BE03EE3C-4EE4-4D64-9C99-4E888DB02C2A}"/>
               </a:ext>
             </a:extLst>
           </p:cNvPr>
@@ -9260,7 +9125,7 @@
           <p:cNvPr id="4" name="내용 개체 틀 3">
             <a:extLst>
               <a:ext uri="{FF2B5EF4-FFF2-40B4-BE49-F238E27FC236}">
-                <a16:creationId xmlns="" xmlns:a16="http://schemas.microsoft.com/office/drawing/2014/main" id="{041886F9-7864-4253-8FDA-F599ED267F64}"/>
+                <a16:creationId xmlns:a16="http://schemas.microsoft.com/office/drawing/2014/main" id="{041886F9-7864-4253-8FDA-F599ED267F64}"/>
               </a:ext>
             </a:extLst>
           </p:cNvPr>
@@ -9298,7 +9163,7 @@
           <p:cNvPr id="6" name="사각형: 둥근 모서리 5">
             <a:extLst>
               <a:ext uri="{FF2B5EF4-FFF2-40B4-BE49-F238E27FC236}">
-                <a16:creationId xmlns="" xmlns:a16="http://schemas.microsoft.com/office/drawing/2014/main" id="{C4C254B6-B288-491C-9B32-AB25D0A81F24}"/>
+                <a16:creationId xmlns:a16="http://schemas.microsoft.com/office/drawing/2014/main" id="{C4C254B6-B288-491C-9B32-AB25D0A81F24}"/>
               </a:ext>
             </a:extLst>
           </p:cNvPr>
@@ -9386,7 +9251,7 @@
           <p:cNvPr id="9" name="그림 8">
             <a:extLst>
               <a:ext uri="{FF2B5EF4-FFF2-40B4-BE49-F238E27FC236}">
-                <a16:creationId xmlns="" xmlns:a16="http://schemas.microsoft.com/office/drawing/2014/main" id="{54DD6795-394E-47A9-BA6A-0E1E83AF11B0}"/>
+                <a16:creationId xmlns:a16="http://schemas.microsoft.com/office/drawing/2014/main" id="{54DD6795-394E-47A9-BA6A-0E1E83AF11B0}"/>
               </a:ext>
             </a:extLst>
           </p:cNvPr>
@@ -9416,7 +9281,7 @@
           <p:cNvPr id="11" name="그림 10">
             <a:extLst>
               <a:ext uri="{FF2B5EF4-FFF2-40B4-BE49-F238E27FC236}">
-                <a16:creationId xmlns="" xmlns:a16="http://schemas.microsoft.com/office/drawing/2014/main" id="{5C2F5FEB-D5F0-4FD1-B187-DE8E521DA69E}"/>
+                <a16:creationId xmlns:a16="http://schemas.microsoft.com/office/drawing/2014/main" id="{5C2F5FEB-D5F0-4FD1-B187-DE8E521DA69E}"/>
               </a:ext>
             </a:extLst>
           </p:cNvPr>
@@ -9446,7 +9311,7 @@
           <p:cNvPr id="12" name="사각형: 둥근 모서리 11">
             <a:extLst>
               <a:ext uri="{FF2B5EF4-FFF2-40B4-BE49-F238E27FC236}">
-                <a16:creationId xmlns="" xmlns:a16="http://schemas.microsoft.com/office/drawing/2014/main" id="{473E43F3-FA51-49E1-B8A3-38DE28E7C649}"/>
+                <a16:creationId xmlns:a16="http://schemas.microsoft.com/office/drawing/2014/main" id="{473E43F3-FA51-49E1-B8A3-38DE28E7C649}"/>
               </a:ext>
             </a:extLst>
           </p:cNvPr>
@@ -9521,7 +9386,7 @@
           <p:cNvPr id="14" name="타원 13">
             <a:extLst>
               <a:ext uri="{FF2B5EF4-FFF2-40B4-BE49-F238E27FC236}">
-                <a16:creationId xmlns="" xmlns:a16="http://schemas.microsoft.com/office/drawing/2014/main" id="{39056DAE-4CB4-40D4-BF28-756F2EF972D4}"/>
+                <a16:creationId xmlns:a16="http://schemas.microsoft.com/office/drawing/2014/main" id="{39056DAE-4CB4-40D4-BF28-756F2EF972D4}"/>
               </a:ext>
             </a:extLst>
           </p:cNvPr>
@@ -9575,7 +9440,7 @@
           <p:cNvPr id="17" name="타원 16">
             <a:extLst>
               <a:ext uri="{FF2B5EF4-FFF2-40B4-BE49-F238E27FC236}">
-                <a16:creationId xmlns="" xmlns:a16="http://schemas.microsoft.com/office/drawing/2014/main" id="{5CF1ACB6-7BE5-44E6-810C-D9CFCC4B7E9E}"/>
+                <a16:creationId xmlns:a16="http://schemas.microsoft.com/office/drawing/2014/main" id="{5CF1ACB6-7BE5-44E6-810C-D9CFCC4B7E9E}"/>
               </a:ext>
             </a:extLst>
           </p:cNvPr>
@@ -9634,13 +9499,6 @@
   <p:clrMapOvr>
     <a:masterClrMapping/>
   </p:clrMapOvr>
-  <p:timing>
-    <p:tnLst>
-      <p:par>
-        <p:cTn id="1" dur="indefinite" restart="never" nodeType="tmRoot"/>
-      </p:par>
-    </p:tnLst>
-  </p:timing>
 </p:sld>
 </file>
 
@@ -9666,7 +9524,7 @@
           <p:cNvPr id="2" name="제목 1">
             <a:extLst>
               <a:ext uri="{FF2B5EF4-FFF2-40B4-BE49-F238E27FC236}">
-                <a16:creationId xmlns="" xmlns:a16="http://schemas.microsoft.com/office/drawing/2014/main" id="{D4C84356-D479-4334-9194-8528CD86A250}"/>
+                <a16:creationId xmlns:a16="http://schemas.microsoft.com/office/drawing/2014/main" id="{D4C84356-D479-4334-9194-8528CD86A250}"/>
               </a:ext>
             </a:extLst>
           </p:cNvPr>
@@ -9700,7 +9558,7 @@
           <p:cNvPr id="5" name="내용 개체 틀 4">
             <a:extLst>
               <a:ext uri="{FF2B5EF4-FFF2-40B4-BE49-F238E27FC236}">
-                <a16:creationId xmlns="" xmlns:a16="http://schemas.microsoft.com/office/drawing/2014/main" id="{388A88A2-0AE2-4C0D-8E41-771A6772CDB6}"/>
+                <a16:creationId xmlns:a16="http://schemas.microsoft.com/office/drawing/2014/main" id="{388A88A2-0AE2-4C0D-8E41-771A6772CDB6}"/>
               </a:ext>
             </a:extLst>
           </p:cNvPr>
@@ -9711,7 +9569,7 @@
             <p:ph sz="quarter" idx="13"/>
             <p:extLst>
               <p:ext uri="{D42A27DB-BD31-4B8C-83A1-F6EECF244321}">
-                <p14:modId xmlns:p14="http://schemas.microsoft.com/office/powerpoint/2010/main" val="2717667292"/>
+                <p14:modId xmlns:p14="http://schemas.microsoft.com/office/powerpoint/2010/main" val="437008899"/>
               </p:ext>
             </p:extLst>
           </p:nvPr>
@@ -9730,21 +9588,21 @@
                 <a:gridCol w="745438">
                   <a:extLst>
                     <a:ext uri="{9D8B030D-6E8A-4147-A177-3AD203B41FA5}">
-                      <a16:colId xmlns="" xmlns:a16="http://schemas.microsoft.com/office/drawing/2014/main" val="817937355"/>
+                      <a16:colId xmlns:a16="http://schemas.microsoft.com/office/drawing/2014/main" val="817937355"/>
                     </a:ext>
                   </a:extLst>
                 </a:gridCol>
                 <a:gridCol w="2210540">
                   <a:extLst>
                     <a:ext uri="{9D8B030D-6E8A-4147-A177-3AD203B41FA5}">
-                      <a16:colId xmlns="" xmlns:a16="http://schemas.microsoft.com/office/drawing/2014/main" val="3024832388"/>
+                      <a16:colId xmlns:a16="http://schemas.microsoft.com/office/drawing/2014/main" val="3024832388"/>
                     </a:ext>
                   </a:extLst>
                 </a:gridCol>
                 <a:gridCol w="7438971">
                   <a:extLst>
                     <a:ext uri="{9D8B030D-6E8A-4147-A177-3AD203B41FA5}">
-                      <a16:colId xmlns="" xmlns:a16="http://schemas.microsoft.com/office/drawing/2014/main" val="340120907"/>
+                      <a16:colId xmlns:a16="http://schemas.microsoft.com/office/drawing/2014/main" val="340120907"/>
                     </a:ext>
                   </a:extLst>
                 </a:gridCol>
@@ -9794,7 +9652,7 @@
                 </a:tc>
                 <a:extLst>
                   <a:ext uri="{0D108BD9-81ED-4DB2-BD59-A6C34878D82A}">
-                    <a16:rowId xmlns="" xmlns:a16="http://schemas.microsoft.com/office/drawing/2014/main" val="423171857"/>
+                    <a16:rowId xmlns:a16="http://schemas.microsoft.com/office/drawing/2014/main" val="423171857"/>
                   </a:ext>
                 </a:extLst>
               </a:tr>
@@ -9887,20 +9745,15 @@
                       </a:r>
                       <a:r>
                         <a:rPr lang="ko-KR" altLang="en-US" sz="1400" dirty="0"/>
-                        <a:t>폭발 등을 </a:t>
-                      </a:r>
-                      <a:r>
-                        <a:rPr lang="ko-KR" altLang="en-US" sz="1400" dirty="0" smtClean="0"/>
-                        <a:t>구한다</a:t>
-                      </a:r>
-                      <a:endParaRPr lang="ko-KR" altLang="en-US" sz="1400" dirty="0"/>
+                        <a:t>폭발 등을 구한다</a:t>
+                      </a:r>
                     </a:p>
                   </a:txBody>
                   <a:tcPr/>
                 </a:tc>
                 <a:extLst>
                   <a:ext uri="{0D108BD9-81ED-4DB2-BD59-A6C34878D82A}">
-                    <a16:rowId xmlns="" xmlns:a16="http://schemas.microsoft.com/office/drawing/2014/main" val="4159277651"/>
+                    <a16:rowId xmlns:a16="http://schemas.microsoft.com/office/drawing/2014/main" val="4159277651"/>
                   </a:ext>
                 </a:extLst>
               </a:tr>
@@ -9955,7 +9808,7 @@
                 </a:tc>
                 <a:extLst>
                   <a:ext uri="{0D108BD9-81ED-4DB2-BD59-A6C34878D82A}">
-                    <a16:rowId xmlns="" xmlns:a16="http://schemas.microsoft.com/office/drawing/2014/main" val="4294934032"/>
+                    <a16:rowId xmlns:a16="http://schemas.microsoft.com/office/drawing/2014/main" val="4294934032"/>
                   </a:ext>
                 </a:extLst>
               </a:tr>
@@ -10010,7 +9863,7 @@
                 </a:tc>
                 <a:extLst>
                   <a:ext uri="{0D108BD9-81ED-4DB2-BD59-A6C34878D82A}">
-                    <a16:rowId xmlns="" xmlns:a16="http://schemas.microsoft.com/office/drawing/2014/main" val="3525428259"/>
+                    <a16:rowId xmlns:a16="http://schemas.microsoft.com/office/drawing/2014/main" val="3525428259"/>
                   </a:ext>
                 </a:extLst>
               </a:tr>
@@ -10064,7 +9917,7 @@
                       <a:pPr latinLnBrk="1"/>
                       <a:r>
                         <a:rPr lang="ko-KR" altLang="en-US" sz="1400" dirty="0"/>
-                        <a:t>적의 움직임 및 보스를 구현한다</a:t>
+                        <a:t>적의 움직임  및 보스를 구현한다</a:t>
                       </a:r>
                       <a:endParaRPr lang="en-US" altLang="ko-KR" sz="1400" dirty="0"/>
                     </a:p>
@@ -10073,7 +9926,7 @@
                 </a:tc>
                 <a:extLst>
                   <a:ext uri="{0D108BD9-81ED-4DB2-BD59-A6C34878D82A}">
-                    <a16:rowId xmlns="" xmlns:a16="http://schemas.microsoft.com/office/drawing/2014/main" val="2725451361"/>
+                    <a16:rowId xmlns:a16="http://schemas.microsoft.com/office/drawing/2014/main" val="2725451361"/>
                   </a:ext>
                 </a:extLst>
               </a:tr>
@@ -10104,19 +9957,7 @@
                       <a:pPr latinLnBrk="1"/>
                       <a:r>
                         <a:rPr lang="ko-KR" altLang="en-US" sz="1400" dirty="0"/>
-                        <a:t>도우미 및 아이템</a:t>
-                      </a:r>
-                      <a:r>
-                        <a:rPr lang="en-US" altLang="ko-KR" sz="1400" dirty="0"/>
-                        <a:t>, </a:t>
-                      </a:r>
-                      <a:r>
-                        <a:rPr lang="ko-KR" altLang="en-US" sz="1400" dirty="0" err="1"/>
-                        <a:t>필살기</a:t>
-                      </a:r>
-                      <a:r>
-                        <a:rPr lang="ko-KR" altLang="en-US" sz="1400" dirty="0"/>
-                        <a:t> 구현</a:t>
+                        <a:t>도우미 및 아이템 구현</a:t>
                       </a:r>
                       <a:endParaRPr lang="en-US" altLang="ko-KR" sz="1400" dirty="0"/>
                     </a:p>
@@ -10131,7 +9972,11 @@
                       <a:pPr latinLnBrk="1"/>
                       <a:r>
                         <a:rPr lang="ko-KR" altLang="en-US" sz="1400" dirty="0"/>
-                        <a:t>캐릭터를 도와줄 도우미를 구현하며 캐릭터의 능력치를 올려 줄 아이템 및 필살기를 구현한다</a:t>
+                        <a:t>캐릭터를 도와줄 도우미를 구현하며 </a:t>
+                      </a:r>
+                      <a:r>
+                        <a:rPr lang="ko-KR" altLang="en-US" sz="1400"/>
+                        <a:t>캐릭터의 아이템을 구현한다</a:t>
                       </a:r>
                       <a:endParaRPr lang="en-US" altLang="ko-KR" sz="1400" dirty="0"/>
                     </a:p>
@@ -10140,7 +9985,7 @@
                 </a:tc>
                 <a:extLst>
                   <a:ext uri="{0D108BD9-81ED-4DB2-BD59-A6C34878D82A}">
-                    <a16:rowId xmlns="" xmlns:a16="http://schemas.microsoft.com/office/drawing/2014/main" val="298300551"/>
+                    <a16:rowId xmlns:a16="http://schemas.microsoft.com/office/drawing/2014/main" val="298300551"/>
                   </a:ext>
                 </a:extLst>
               </a:tr>
@@ -10158,13 +10003,6 @@
   <p:clrMapOvr>
     <a:masterClrMapping/>
   </p:clrMapOvr>
-  <p:timing>
-    <p:tnLst>
-      <p:par>
-        <p:cTn id="1" dur="indefinite" restart="never" nodeType="tmRoot"/>
-      </p:par>
-    </p:tnLst>
-  </p:timing>
 </p:sld>
 </file>
 

</xml_diff>